<commit_message>
Adding additional subroutine and stack example code and updating the lesson notes and slides.
</commit_message>
<xml_diff>
--- a/notes/L10/Lsn10.pptx
+++ b/notes/L10/Lsn10.pptx
@@ -3879,12 +3879,20 @@
           <a:p>
             <a:pPr lvl="1" algn="l"/>
             <a:r>
+              <a:rPr lang="en-US" sz="2000" dirty="0" err="1" smtClean="0">
+                <a:solidFill>
+                  <a:srgbClr val="0070C0"/>
+                </a:solidFill>
+              </a:rPr>
+              <a:t>MiniQuiz</a:t>
+            </a:r>
+            <a:r>
               <a:rPr lang="en-US" sz="2000" dirty="0" smtClean="0">
                 <a:solidFill>
                   <a:srgbClr val="0070C0"/>
                 </a:solidFill>
               </a:rPr>
-              <a:t>Demo Lab 1 functionality by COB tomorrow!</a:t>
+              <a:t>!! Next time</a:t>
             </a:r>
           </a:p>
           <a:p>
@@ -3895,15 +3903,26 @@
                   <a:srgbClr val="0070C0"/>
                 </a:solidFill>
               </a:rPr>
-              <a:t>Lab 2 </a:t>
-            </a:r>
-            <a:r>
-              <a:rPr lang="en-US" sz="2000" dirty="0" err="1" smtClean="0">
+              <a:t>Demo </a:t>
+            </a:r>
+            <a:r>
+              <a:rPr lang="en-US" sz="2000" dirty="0" smtClean="0">
                 <a:solidFill>
                   <a:srgbClr val="0070C0"/>
                 </a:solidFill>
               </a:rPr>
-              <a:t>prelab</a:t>
+              <a:t>Lab 1 functionality by COB today!</a:t>
+            </a:r>
+          </a:p>
+          <a:p>
+            <a:pPr lvl="1" algn="l"/>
+            <a:r>
+              <a:rPr lang="en-US" sz="2000" dirty="0">
+                <a:solidFill>
+                  <a:srgbClr val="0070C0"/>
+                </a:solidFill>
+              </a:rPr>
+              <a:t>Assignment 4 </a:t>
             </a:r>
             <a:r>
               <a:rPr lang="en-US" sz="2000" dirty="0" smtClean="0">
@@ -3911,7 +3930,31 @@
                   <a:srgbClr val="0070C0"/>
                 </a:solidFill>
               </a:rPr>
-              <a:t> due BOC next lesson</a:t>
+              <a:t>due BOC next Lesson</a:t>
+            </a:r>
+            <a:endParaRPr lang="en-US" sz="2000" dirty="0">
+              <a:solidFill>
+                <a:srgbClr val="0070C0"/>
+              </a:solidFill>
+            </a:endParaRPr>
+          </a:p>
+          <a:p>
+            <a:pPr lvl="1" algn="l"/>
+            <a:r>
+              <a:rPr lang="en-US" sz="2000" dirty="0" smtClean="0">
+                <a:solidFill>
+                  <a:srgbClr val="0070C0"/>
+                </a:solidFill>
+              </a:rPr>
+              <a:t>Lab </a:t>
+            </a:r>
+            <a:r>
+              <a:rPr lang="en-US" sz="2000" dirty="0" smtClean="0">
+                <a:solidFill>
+                  <a:srgbClr val="0070C0"/>
+                </a:solidFill>
+              </a:rPr>
+              <a:t>2 prelab due BOC next lesson</a:t>
             </a:r>
             <a:endParaRPr lang="en-US" sz="2000" dirty="0">
               <a:solidFill>
@@ -4328,6 +4371,13 @@
   <p:clrMapOvr>
     <a:masterClrMapping/>
   </p:clrMapOvr>
+  <p:timing>
+    <p:tnLst>
+      <p:par>
+        <p:cTn id="1" dur="indefinite" restart="never" nodeType="tmRoot"/>
+      </p:par>
+    </p:tnLst>
+  </p:timing>
 </p:sld>
 </file>
 
@@ -4438,7 +4488,28 @@
                 <a:latin typeface="Courier New" pitchFamily="49" charset="0"/>
                 <a:cs typeface="Courier New" pitchFamily="49" charset="0"/>
               </a:rPr>
-              <a:t>;Author: Capt Todd Branchflower, USAF</a:t>
+              <a:t>;Author: Capt </a:t>
+            </a:r>
+            <a:r>
+              <a:rPr lang="en-US" sz="1400" dirty="0" smtClean="0">
+                <a:latin typeface="Courier New" pitchFamily="49" charset="0"/>
+                <a:cs typeface="Courier New" pitchFamily="49" charset="0"/>
+              </a:rPr>
+              <a:t>Jeff Falkinburg</a:t>
+            </a:r>
+            <a:r>
+              <a:rPr lang="en-US" sz="1400" dirty="0" smtClean="0">
+                <a:latin typeface="Courier New" pitchFamily="49" charset="0"/>
+                <a:cs typeface="Courier New" pitchFamily="49" charset="0"/>
+              </a:rPr>
+              <a:t>, </a:t>
+            </a:r>
+            <a:r>
+              <a:rPr lang="en-US" sz="1400" dirty="0">
+                <a:latin typeface="Courier New" pitchFamily="49" charset="0"/>
+                <a:cs typeface="Courier New" pitchFamily="49" charset="0"/>
+              </a:rPr>
+              <a:t>USAF</a:t>
             </a:r>
           </a:p>
           <a:p>
@@ -4608,6 +4679,13 @@
   <p:clrMapOvr>
     <a:masterClrMapping/>
   </p:clrMapOvr>
+  <p:timing>
+    <p:tnLst>
+      <p:par>
+        <p:cTn id="1" dur="indefinite" restart="never" nodeType="tmRoot"/>
+      </p:par>
+    </p:tnLst>
+  </p:timing>
 </p:sld>
 </file>
 
@@ -4861,6 +4939,13 @@
   <p:clrMapOvr>
     <a:masterClrMapping/>
   </p:clrMapOvr>
+  <p:timing>
+    <p:tnLst>
+      <p:par>
+        <p:cTn id="1" dur="indefinite" restart="never" nodeType="tmRoot"/>
+      </p:par>
+    </p:tnLst>
+  </p:timing>
 </p:sld>
 </file>
 
@@ -5021,6 +5106,13 @@
   <p:clrMapOvr>
     <a:masterClrMapping/>
   </p:clrMapOvr>
+  <p:timing>
+    <p:tnLst>
+      <p:par>
+        <p:cTn id="1" dur="indefinite" restart="never" nodeType="tmRoot"/>
+      </p:par>
+    </p:tnLst>
+  </p:timing>
 </p:sld>
 </file>
 
@@ -5089,7 +5181,7 @@
         <p:spPr>
           <a:xfrm>
             <a:off x="1223444" y="1323945"/>
-            <a:ext cx="8621400" cy="4773150"/>
+            <a:ext cx="7768156" cy="4773150"/>
           </a:xfrm>
         </p:spPr>
         <p:txBody>
@@ -5159,14 +5251,14 @@
               <a:t>;</a:t>
             </a:r>
             <a:r>
-              <a:rPr lang="en-US" sz="1400" dirty="0" err="1">
+              <a:rPr lang="en-US" sz="1400" dirty="0" smtClean="0">
                 <a:solidFill>
                   <a:schemeClr val="accent2"/>
                 </a:solidFill>
                 <a:latin typeface="Courier New" pitchFamily="49" charset="0"/>
                 <a:cs typeface="Courier New" pitchFamily="49" charset="0"/>
               </a:rPr>
-              <a:t>Authoer</a:t>
+              <a:t>Author</a:t>
             </a:r>
             <a:r>
               <a:rPr lang="en-US" sz="1400" dirty="0">
@@ -5176,7 +5268,27 @@
                 <a:latin typeface="Courier New" pitchFamily="49" charset="0"/>
                 <a:cs typeface="Courier New" pitchFamily="49" charset="0"/>
               </a:rPr>
-              <a:t>: Capt Todd Branchflower, USAF</a:t>
+              <a:t>: Capt </a:t>
+            </a:r>
+            <a:r>
+              <a:rPr lang="en-US" sz="1400" dirty="0" smtClean="0">
+                <a:solidFill>
+                  <a:schemeClr val="accent2"/>
+                </a:solidFill>
+                <a:latin typeface="Courier New" pitchFamily="49" charset="0"/>
+                <a:cs typeface="Courier New" pitchFamily="49" charset="0"/>
+              </a:rPr>
+              <a:t>Jeff Falkinburg, </a:t>
+            </a:r>
+            <a:r>
+              <a:rPr lang="en-US" sz="1400" dirty="0">
+                <a:solidFill>
+                  <a:schemeClr val="accent2"/>
+                </a:solidFill>
+                <a:latin typeface="Courier New" pitchFamily="49" charset="0"/>
+                <a:cs typeface="Courier New" pitchFamily="49" charset="0"/>
+              </a:rPr>
+              <a:t>USAF</a:t>
             </a:r>
           </a:p>
           <a:p>
@@ -5470,6 +5582,13 @@
   <p:clrMapOvr>
     <a:masterClrMapping/>
   </p:clrMapOvr>
+  <p:timing>
+    <p:tnLst>
+      <p:par>
+        <p:cTn id="1" dur="indefinite" restart="never" nodeType="tmRoot"/>
+      </p:par>
+    </p:tnLst>
+  </p:timing>
 </p:sld>
 </file>
 
@@ -5739,13 +5858,13 @@
           <a:p>
             <a:r>
               <a:rPr lang="en-US" sz="2000" dirty="0">
-                <a:hlinkClick r:id="rId2" action="ppaction://hlinkfile"/>
+                <a:hlinkClick r:id="rId2"/>
               </a:rPr>
               <a:t>Lab </a:t>
             </a:r>
             <a:r>
               <a:rPr lang="en-US" sz="2000" dirty="0" smtClean="0">
-                <a:hlinkClick r:id="rId2" action="ppaction://hlinkfile"/>
+                <a:hlinkClick r:id="rId2"/>
               </a:rPr>
               <a:t>2</a:t>
             </a:r>
@@ -5855,6 +5974,13 @@
   <p:clrMapOvr>
     <a:masterClrMapping/>
   </p:clrMapOvr>
+  <p:timing>
+    <p:tnLst>
+      <p:par>
+        <p:cTn id="1" dur="indefinite" restart="never" nodeType="tmRoot"/>
+      </p:par>
+    </p:tnLst>
+  </p:timing>
 </p:sld>
 </file>
 
@@ -6087,6 +6213,13 @@
   <p:clrMapOvr>
     <a:masterClrMapping/>
   </p:clrMapOvr>
+  <p:timing>
+    <p:tnLst>
+      <p:par>
+        <p:cTn id="1" dur="indefinite" restart="never" nodeType="tmRoot"/>
+      </p:par>
+    </p:tnLst>
+  </p:timing>
 </p:sld>
 </file>
 
@@ -6262,7 +6395,7 @@
         </p:nvGraphicFramePr>
         <p:xfrm>
           <a:off x="871267" y="1068286"/>
-          <a:ext cx="6763111" cy="801243"/>
+          <a:ext cx="6763111" cy="814705"/>
         </p:xfrm>
         <a:graphic>
           <a:graphicData uri="http://schemas.openxmlformats.org/drawingml/2006/table">
@@ -6596,7 +6729,7 @@
         </p:nvGraphicFramePr>
         <p:xfrm>
           <a:off x="879831" y="1980121"/>
-          <a:ext cx="6797742" cy="392176"/>
+          <a:ext cx="6797742" cy="419100"/>
         </p:xfrm>
         <a:graphic>
           <a:graphicData uri="http://schemas.openxmlformats.org/drawingml/2006/table">
@@ -7000,6 +7133,13 @@
   <p:clrMapOvr>
     <a:masterClrMapping/>
   </p:clrMapOvr>
+  <p:timing>
+    <p:tnLst>
+      <p:par>
+        <p:cTn id="1" dur="indefinite" restart="never" nodeType="tmRoot"/>
+      </p:par>
+    </p:tnLst>
+  </p:timing>
 </p:sld>
 </file>
 
@@ -8199,7 +8339,7 @@
         </p:nvGraphicFramePr>
         <p:xfrm>
           <a:off x="6443608" y="3656252"/>
-          <a:ext cx="1725930" cy="1451864"/>
+          <a:ext cx="1725930" cy="1542288"/>
         </p:xfrm>
         <a:graphic>
           <a:graphicData uri="http://schemas.openxmlformats.org/drawingml/2006/table">
@@ -9295,6 +9435,13 @@
   <p:clrMapOvr>
     <a:masterClrMapping/>
   </p:clrMapOvr>
+  <p:timing>
+    <p:tnLst>
+      <p:par>
+        <p:cTn id="1" dur="indefinite" restart="never" nodeType="tmRoot"/>
+      </p:par>
+    </p:tnLst>
+  </p:timing>
 </p:sld>
 </file>
 
@@ -9492,6 +9639,13 @@
   <p:clrMapOvr>
     <a:masterClrMapping/>
   </p:clrMapOvr>
+  <p:timing>
+    <p:tnLst>
+      <p:par>
+        <p:cTn id="1" dur="indefinite" restart="never" nodeType="tmRoot"/>
+      </p:par>
+    </p:tnLst>
+  </p:timing>
 </p:sld>
 </file>
 
@@ -9770,7 +9924,7 @@
         </p:nvGraphicFramePr>
         <p:xfrm>
           <a:off x="862641" y="1777042"/>
-          <a:ext cx="6763111" cy="770518"/>
+          <a:ext cx="6763111" cy="783980"/>
         </p:xfrm>
         <a:graphic>
           <a:graphicData uri="http://schemas.openxmlformats.org/drawingml/2006/table">
@@ -10104,7 +10258,7 @@
         </p:nvGraphicFramePr>
         <p:xfrm>
           <a:off x="845327" y="2714566"/>
-          <a:ext cx="6797742" cy="398018"/>
+          <a:ext cx="6797742" cy="419100"/>
         </p:xfrm>
         <a:graphic>
           <a:graphicData uri="http://schemas.openxmlformats.org/drawingml/2006/table">
@@ -10551,6 +10705,13 @@
   <p:clrMapOvr>
     <a:masterClrMapping/>
   </p:clrMapOvr>
+  <p:timing>
+    <p:tnLst>
+      <p:par>
+        <p:cTn id="1" dur="indefinite" restart="never" nodeType="tmRoot"/>
+      </p:par>
+    </p:tnLst>
+  </p:timing>
 </p:sld>
 </file>
 

</xml_diff>

<commit_message>
Updated last slide for the lesson 10 slides
</commit_message>
<xml_diff>
--- a/notes/L10/Lsn10.pptx
+++ b/notes/L10/Lsn10.pptx
@@ -5,10 +5,10 @@
     <p:sldMasterId id="2147483648" r:id="rId1"/>
   </p:sldMasterIdLst>
   <p:notesMasterIdLst>
-    <p:notesMasterId r:id="rId18"/>
+    <p:notesMasterId r:id="rId19"/>
   </p:notesMasterIdLst>
   <p:handoutMasterIdLst>
-    <p:handoutMasterId r:id="rId19"/>
+    <p:handoutMasterId r:id="rId20"/>
   </p:handoutMasterIdLst>
   <p:sldIdLst>
     <p:sldId id="282" r:id="rId2"/>
@@ -26,7 +26,8 @@
     <p:sldId id="353" r:id="rId14"/>
     <p:sldId id="354" r:id="rId15"/>
     <p:sldId id="355" r:id="rId16"/>
-    <p:sldId id="344" r:id="rId17"/>
+    <p:sldId id="356" r:id="rId17"/>
+    <p:sldId id="344" r:id="rId18"/>
   </p:sldIdLst>
   <p:sldSz cx="9144000" cy="6858000" type="screen4x3"/>
   <p:notesSz cx="6985000" cy="9283700"/>
@@ -3903,15 +3904,7 @@
                   <a:srgbClr val="0070C0"/>
                 </a:solidFill>
               </a:rPr>
-              <a:t>Demo </a:t>
-            </a:r>
-            <a:r>
-              <a:rPr lang="en-US" sz="2000" dirty="0" smtClean="0">
-                <a:solidFill>
-                  <a:srgbClr val="0070C0"/>
-                </a:solidFill>
-              </a:rPr>
-              <a:t>Lab 1 functionality by COB today!</a:t>
+              <a:t>Demo Lab 1 functionality by COB today!</a:t>
             </a:r>
           </a:p>
           <a:p>
@@ -3946,15 +3939,7 @@
                   <a:srgbClr val="0070C0"/>
                 </a:solidFill>
               </a:rPr>
-              <a:t>Lab </a:t>
-            </a:r>
-            <a:r>
-              <a:rPr lang="en-US" sz="2000" dirty="0" smtClean="0">
-                <a:solidFill>
-                  <a:srgbClr val="0070C0"/>
-                </a:solidFill>
-              </a:rPr>
-              <a:t>2 prelab due BOC next lesson</a:t>
+              <a:t>Lab 2 prelab due BOC next lesson</a:t>
             </a:r>
             <a:endParaRPr lang="en-US" sz="2000" dirty="0">
               <a:solidFill>
@@ -4495,14 +4480,7 @@
                 <a:latin typeface="Courier New" pitchFamily="49" charset="0"/>
                 <a:cs typeface="Courier New" pitchFamily="49" charset="0"/>
               </a:rPr>
-              <a:t>Jeff Falkinburg</a:t>
-            </a:r>
-            <a:r>
-              <a:rPr lang="en-US" sz="1400" dirty="0" smtClean="0">
-                <a:latin typeface="Courier New" pitchFamily="49" charset="0"/>
-                <a:cs typeface="Courier New" pitchFamily="49" charset="0"/>
-              </a:rPr>
-              <a:t>, </a:t>
+              <a:t>Jeff Falkinburg, </a:t>
             </a:r>
             <a:r>
               <a:rPr lang="en-US" sz="1400" dirty="0">
@@ -5780,6 +5758,122 @@
 </file>
 
 <file path=ppt/slides/slide16.xml><?xml version="1.0" encoding="utf-8"?>
+<p:sld xmlns:a="http://schemas.openxmlformats.org/drawingml/2006/main" xmlns:r="http://schemas.openxmlformats.org/officeDocument/2006/relationships" xmlns:p="http://schemas.openxmlformats.org/presentationml/2006/main">
+  <p:cSld>
+    <p:spTree>
+      <p:nvGrpSpPr>
+        <p:cNvPr id="1" name=""/>
+        <p:cNvGrpSpPr/>
+        <p:nvPr/>
+      </p:nvGrpSpPr>
+      <p:grpSpPr>
+        <a:xfrm>
+          <a:off x="0" y="0"/>
+          <a:ext cx="0" cy="0"/>
+          <a:chOff x="0" y="0"/>
+          <a:chExt cx="0" cy="0"/>
+        </a:xfrm>
+      </p:grpSpPr>
+      <p:sp>
+        <p:nvSpPr>
+          <p:cNvPr id="2" name="Title 1"/>
+          <p:cNvSpPr>
+            <a:spLocks noGrp="1"/>
+          </p:cNvSpPr>
+          <p:nvPr>
+            <p:ph type="title"/>
+          </p:nvPr>
+        </p:nvSpPr>
+        <p:spPr/>
+        <p:txBody>
+          <a:bodyPr/>
+          <a:lstStyle/>
+          <a:p>
+            <a:r>
+              <a:rPr lang="en-US" b="1" dirty="0"/>
+              <a:t>Application Binary Interface (ABI</a:t>
+            </a:r>
+            <a:r>
+              <a:rPr lang="en-US" b="1" dirty="0" smtClean="0"/>
+              <a:t>)</a:t>
+            </a:r>
+            <a:endParaRPr lang="en-US" b="1" dirty="0"/>
+          </a:p>
+        </p:txBody>
+      </p:sp>
+      <p:sp>
+        <p:nvSpPr>
+          <p:cNvPr id="3" name="Content Placeholder 2"/>
+          <p:cNvSpPr>
+            <a:spLocks noGrp="1"/>
+          </p:cNvSpPr>
+          <p:nvPr>
+            <p:ph idx="1"/>
+          </p:nvPr>
+        </p:nvSpPr>
+        <p:spPr/>
+        <p:txBody>
+          <a:bodyPr/>
+          <a:lstStyle/>
+          <a:p>
+            <a:r>
+              <a:rPr lang="en-US" dirty="0" smtClean="0"/>
+              <a:t>Convention </a:t>
+            </a:r>
+            <a:r>
+              <a:rPr lang="en-US" dirty="0"/>
+              <a:t>of specifying which registers are used for arguments passed in to a subroutine and which are used to pass back results. </a:t>
+            </a:r>
+            <a:endParaRPr lang="en-US" dirty="0" smtClean="0"/>
+          </a:p>
+          <a:p>
+            <a:r>
+              <a:rPr lang="en-US" dirty="0" smtClean="0"/>
+              <a:t>For subroutines in the MSP430 use </a:t>
+            </a:r>
+            <a:r>
+              <a:rPr lang="en-US" dirty="0"/>
+              <a:t>r12, r13, r14, and r15 to pass arguments to your subroutine. </a:t>
+            </a:r>
+            <a:endParaRPr lang="en-US" dirty="0" smtClean="0"/>
+          </a:p>
+          <a:p>
+            <a:r>
+              <a:rPr lang="en-US" dirty="0" smtClean="0"/>
+              <a:t>Use the stack if you have more than </a:t>
+            </a:r>
+            <a:r>
+              <a:rPr lang="en-US" smtClean="0"/>
+              <a:t>four arguments</a:t>
+            </a:r>
+            <a:endParaRPr lang="en-US" dirty="0" smtClean="0"/>
+          </a:p>
+          <a:p>
+            <a:endParaRPr lang="en-US" dirty="0"/>
+          </a:p>
+        </p:txBody>
+      </p:sp>
+    </p:spTree>
+    <p:extLst>
+      <p:ext uri="{BB962C8B-B14F-4D97-AF65-F5344CB8AC3E}">
+        <p14:creationId xmlns:p14="http://schemas.microsoft.com/office/powerpoint/2010/main" val="1516609488"/>
+      </p:ext>
+    </p:extLst>
+  </p:cSld>
+  <p:clrMapOvr>
+    <a:masterClrMapping/>
+  </p:clrMapOvr>
+  <p:timing>
+    <p:tnLst>
+      <p:par>
+        <p:cTn id="1" dur="indefinite" restart="never" nodeType="tmRoot"/>
+      </p:par>
+    </p:tnLst>
+  </p:timing>
+</p:sld>
+</file>
+
+<file path=ppt/slides/slide17.xml><?xml version="1.0" encoding="utf-8"?>
 <p:sld xmlns:a="http://schemas.openxmlformats.org/drawingml/2006/main" xmlns:r="http://schemas.openxmlformats.org/officeDocument/2006/relationships" xmlns:p="http://schemas.openxmlformats.org/presentationml/2006/main">
   <p:cSld>
     <p:spTree>

</xml_diff>